<commit_message>
updates following second submission to professors
includes edits to the thesis document, addition of 2nd experimental
results.
</commit_message>
<xml_diff>
--- a/defense/zemax_simulation.pptx
+++ b/defense/zemax_simulation.pptx
@@ -218,7 +218,7 @@
           <a:p>
             <a:fld id="{72DB285B-A16E-49FA-9002-143B084C6C9A}" type="datetimeFigureOut">
               <a:rPr lang="en-US" smtClean="0"/>
-              <a:t>11/19/2016</a:t>
+              <a:t>11/21/2016</a:t>
             </a:fld>
             <a:endParaRPr lang="en-US"/>
           </a:p>
@@ -976,7 +976,7 @@
           <a:p>
             <a:fld id="{9D9501FF-ABFD-4A20-9D6D-E502A59752B5}" type="datetimeFigureOut">
               <a:rPr lang="en-US" smtClean="0"/>
-              <a:t>11/19/2016</a:t>
+              <a:t>11/21/2016</a:t>
             </a:fld>
             <a:endParaRPr lang="en-US"/>
           </a:p>
@@ -1144,7 +1144,7 @@
           <a:p>
             <a:fld id="{9D9501FF-ABFD-4A20-9D6D-E502A59752B5}" type="datetimeFigureOut">
               <a:rPr lang="en-US" smtClean="0"/>
-              <a:t>11/19/2016</a:t>
+              <a:t>11/21/2016</a:t>
             </a:fld>
             <a:endParaRPr lang="en-US"/>
           </a:p>
@@ -1322,7 +1322,7 @@
           <a:p>
             <a:fld id="{9D9501FF-ABFD-4A20-9D6D-E502A59752B5}" type="datetimeFigureOut">
               <a:rPr lang="en-US" smtClean="0"/>
-              <a:t>11/19/2016</a:t>
+              <a:t>11/21/2016</a:t>
             </a:fld>
             <a:endParaRPr lang="en-US"/>
           </a:p>
@@ -1490,7 +1490,7 @@
           <a:p>
             <a:fld id="{9D9501FF-ABFD-4A20-9D6D-E502A59752B5}" type="datetimeFigureOut">
               <a:rPr lang="en-US" smtClean="0"/>
-              <a:t>11/19/2016</a:t>
+              <a:t>11/21/2016</a:t>
             </a:fld>
             <a:endParaRPr lang="en-US"/>
           </a:p>
@@ -1735,7 +1735,7 @@
           <a:p>
             <a:fld id="{9D9501FF-ABFD-4A20-9D6D-E502A59752B5}" type="datetimeFigureOut">
               <a:rPr lang="en-US" smtClean="0"/>
-              <a:t>11/19/2016</a:t>
+              <a:t>11/21/2016</a:t>
             </a:fld>
             <a:endParaRPr lang="en-US"/>
           </a:p>
@@ -1964,7 +1964,7 @@
           <a:p>
             <a:fld id="{9D9501FF-ABFD-4A20-9D6D-E502A59752B5}" type="datetimeFigureOut">
               <a:rPr lang="en-US" smtClean="0"/>
-              <a:t>11/19/2016</a:t>
+              <a:t>11/21/2016</a:t>
             </a:fld>
             <a:endParaRPr lang="en-US"/>
           </a:p>
@@ -2328,7 +2328,7 @@
           <a:p>
             <a:fld id="{9D9501FF-ABFD-4A20-9D6D-E502A59752B5}" type="datetimeFigureOut">
               <a:rPr lang="en-US" smtClean="0"/>
-              <a:t>11/19/2016</a:t>
+              <a:t>11/21/2016</a:t>
             </a:fld>
             <a:endParaRPr lang="en-US"/>
           </a:p>
@@ -2445,7 +2445,7 @@
           <a:p>
             <a:fld id="{9D9501FF-ABFD-4A20-9D6D-E502A59752B5}" type="datetimeFigureOut">
               <a:rPr lang="en-US" smtClean="0"/>
-              <a:t>11/19/2016</a:t>
+              <a:t>11/21/2016</a:t>
             </a:fld>
             <a:endParaRPr lang="en-US"/>
           </a:p>
@@ -2540,7 +2540,7 @@
           <a:p>
             <a:fld id="{9D9501FF-ABFD-4A20-9D6D-E502A59752B5}" type="datetimeFigureOut">
               <a:rPr lang="en-US" smtClean="0"/>
-              <a:t>11/19/2016</a:t>
+              <a:t>11/21/2016</a:t>
             </a:fld>
             <a:endParaRPr lang="en-US"/>
           </a:p>
@@ -2815,7 +2815,7 @@
           <a:p>
             <a:fld id="{9D9501FF-ABFD-4A20-9D6D-E502A59752B5}" type="datetimeFigureOut">
               <a:rPr lang="en-US" smtClean="0"/>
-              <a:t>11/19/2016</a:t>
+              <a:t>11/21/2016</a:t>
             </a:fld>
             <a:endParaRPr lang="en-US"/>
           </a:p>
@@ -3070,7 +3070,7 @@
           <a:p>
             <a:fld id="{9D9501FF-ABFD-4A20-9D6D-E502A59752B5}" type="datetimeFigureOut">
               <a:rPr lang="en-US" smtClean="0"/>
-              <a:t>11/19/2016</a:t>
+              <a:t>11/21/2016</a:t>
             </a:fld>
             <a:endParaRPr lang="en-US"/>
           </a:p>
@@ -3281,7 +3281,7 @@
           <a:p>
             <a:fld id="{9D9501FF-ABFD-4A20-9D6D-E502A59752B5}" type="datetimeFigureOut">
               <a:rPr lang="en-US" smtClean="0"/>
-              <a:t>11/19/2016</a:t>
+              <a:t>11/21/2016</a:t>
             </a:fld>
             <a:endParaRPr lang="en-US"/>
           </a:p>
@@ -4640,8 +4640,8 @@
           </a:p>
         </p:txBody>
       </p:sp>
-      <mc:AlternateContent xmlns:mc="http://schemas.openxmlformats.org/markup-compatibility/2006">
-        <mc:Choice xmlns:a14="http://schemas.microsoft.com/office/drawing/2010/main" Requires="a14">
+      <mc:AlternateContent xmlns:mc="http://schemas.openxmlformats.org/markup-compatibility/2006" xmlns:a14="http://schemas.microsoft.com/office/drawing/2010/main">
+        <mc:Choice Requires="a14">
           <p:sp>
             <p:nvSpPr>
               <p:cNvPr id="21" name="TextBox 20" hidden="1"/>
@@ -4701,7 +4701,7 @@
             </p:txBody>
           </p:sp>
         </mc:Choice>
-        <mc:Fallback>
+        <mc:Fallback xmlns="">
           <p:sp>
             <p:nvSpPr>
               <p:cNvPr id="21" name="TextBox 20" hidden="1"/>
@@ -4840,8 +4840,8 @@
           </a:p>
         </p:txBody>
       </p:sp>
-      <mc:AlternateContent xmlns:mc="http://schemas.openxmlformats.org/markup-compatibility/2006">
-        <mc:Choice xmlns:a14="http://schemas.microsoft.com/office/drawing/2010/main" Requires="a14">
+      <mc:AlternateContent xmlns:mc="http://schemas.openxmlformats.org/markup-compatibility/2006" xmlns:a14="http://schemas.microsoft.com/office/drawing/2010/main">
+        <mc:Choice Requires="a14">
           <p:sp>
             <p:nvSpPr>
               <p:cNvPr id="24" name="TextBox 23" hidden="1"/>
@@ -4920,7 +4920,7 @@
             </p:txBody>
           </p:sp>
         </mc:Choice>
-        <mc:Fallback>
+        <mc:Fallback xmlns="">
           <p:sp>
             <p:nvSpPr>
               <p:cNvPr id="24" name="TextBox 23" hidden="1"/>
@@ -4959,8 +4959,8 @@
           </p:sp>
         </mc:Fallback>
       </mc:AlternateContent>
-      <mc:AlternateContent xmlns:mc="http://schemas.openxmlformats.org/markup-compatibility/2006">
-        <mc:Choice xmlns:a14="http://schemas.microsoft.com/office/drawing/2010/main" Requires="a14">
+      <mc:AlternateContent xmlns:mc="http://schemas.openxmlformats.org/markup-compatibility/2006" xmlns:a14="http://schemas.microsoft.com/office/drawing/2010/main">
+        <mc:Choice Requires="a14">
           <p:sp>
             <p:nvSpPr>
               <p:cNvPr id="25" name="TextBox 24" hidden="1"/>
@@ -5020,7 +5020,7 @@
             </p:txBody>
           </p:sp>
         </mc:Choice>
-        <mc:Fallback>
+        <mc:Fallback xmlns="">
           <p:sp>
             <p:nvSpPr>
               <p:cNvPr id="25" name="TextBox 24" hidden="1"/>
@@ -7819,13 +7819,8 @@
           <a:p>
             <a:r>
               <a:rPr lang="en-US"/>
-              <a:t>C</a:t>
+              <a:t>C:\GIT_REPOSITORIES\phd-artifacts\chapters\chapter05_extending_imaging_volume\images\focus_stacking_schematic.ppt</a:t>
             </a:r>
-            <a:r>
-              <a:rPr lang="en-US"/>
-              <a:t>:\GIT_REPOSITORIES\phd-artifacts\chapters\chapter05_extending_imaging_volume\images\focus_stacking_schematic.ppt</a:t>
-            </a:r>
-            <a:endParaRPr lang="en-US"/>
           </a:p>
         </p:txBody>
       </p:sp>
@@ -9786,8 +9781,8 @@
         </p:nvSpPr>
         <p:spPr>
           <a:xfrm>
-            <a:off x="7694717" y="6551547"/>
-            <a:ext cx="4512004" cy="307777"/>
+            <a:off x="8047142" y="6551547"/>
+            <a:ext cx="4157741" cy="307777"/>
           </a:xfrm>
           <a:prstGeom prst="rect">
             <a:avLst/>
@@ -9811,7 +9806,20 @@
                 <a:latin typeface="Times New Roman" panose="02020603050405020304" pitchFamily="18" charset="0"/>
                 <a:cs typeface="Times New Roman" panose="02020603050405020304" pitchFamily="18" charset="0"/>
               </a:rPr>
-              <a:t>[Ref: Merklinger, H. M. (1996). Focusing the view camera.]</a:t>
+              <a:t>[</a:t>
+            </a:r>
+            <a:r>
+              <a:rPr lang="en-US" sz="1400">
+                <a:solidFill>
+                  <a:schemeClr val="tx1">
+                    <a:lumMod val="75000"/>
+                    <a:lumOff val="25000"/>
+                  </a:schemeClr>
+                </a:solidFill>
+                <a:latin typeface="Times New Roman" panose="02020603050405020304" pitchFamily="18" charset="0"/>
+                <a:cs typeface="Times New Roman" panose="02020603050405020304" pitchFamily="18" charset="0"/>
+              </a:rPr>
+              <a:t>Merklinger, H. M. (1996). Focusing the view camera.]</a:t>
             </a:r>
           </a:p>
         </p:txBody>

</xml_diff>